<commit_message>
Start Week 6 solution
</commit_message>
<xml_diff>
--- a/Week_5/Lectures/5.2_ORM.pptx
+++ b/Week_5/Lectures/5.2_ORM.pptx
@@ -388,7 +388,7 @@
     </p:spTree>
     <p:extLst>
       <p:ext uri="{BB962C8B-B14F-4D97-AF65-F5344CB8AC3E}">
-        <p14:creationId xmlns:p14="http://schemas.microsoft.com/office/powerpoint/2010/main" val="1908050567"/>
+        <p14:creationId xmlns:p14="http://schemas.microsoft.com/office/powerpoint/2010/main" val="121502758"/>
       </p:ext>
     </p:extLst>
   </p:cSld>
@@ -1022,7 +1022,7 @@
         </p:nvSpPr>
         <p:spPr>
           <a:xfrm>
-            <a:off x="381300" y="685800"/>
+            <a:off x="381000" y="685800"/>
             <a:ext cx="6096000" cy="3429000"/>
           </a:xfrm>
           <a:custGeom>
@@ -5628,7 +5628,7 @@
               </a:spcBef>
             </a:pPr>
             <a:r>
-              <a:rPr lang="en" u="sng" dirty="0">
+              <a:rPr lang="en" u="sng">
                 <a:solidFill>
                   <a:schemeClr val="hlink"/>
                 </a:solidFill>
@@ -5644,7 +5644,7 @@
               </a:spcBef>
             </a:pPr>
             <a:r>
-              <a:rPr lang="en" u="sng" dirty="0">
+              <a:rPr lang="en" u="sng">
                 <a:solidFill>
                   <a:schemeClr val="hlink"/>
                 </a:solidFill>
@@ -5660,7 +5660,7 @@
               </a:spcBef>
             </a:pPr>
             <a:r>
-              <a:rPr lang="en" u="sng" dirty="0">
+              <a:rPr lang="en" u="sng">
                 <a:solidFill>
                   <a:schemeClr val="hlink"/>
                 </a:solidFill>
@@ -5676,7 +5676,7 @@
               </a:spcBef>
               <a:buNone/>
             </a:pPr>
-            <a:endParaRPr dirty="0"/>
+            <a:endParaRPr/>
           </a:p>
           <a:p>
             <a:pPr lvl="0" rtl="0">
@@ -5685,7 +5685,7 @@
               </a:spcBef>
               <a:buNone/>
             </a:pPr>
-            <a:endParaRPr dirty="0"/>
+            <a:endParaRPr/>
           </a:p>
         </p:txBody>
       </p:sp>
@@ -6338,7 +6338,7 @@
               <a:buNone/>
             </a:pPr>
             <a:r>
-              <a:rPr lang="en"/>
+              <a:rPr lang="en" dirty="0"/>
               <a:t>We then define a model in our code that matches the database table schema:</a:t>
             </a:r>
           </a:p>
@@ -6355,7 +6355,7 @@
               </a:spcAft>
               <a:buNone/>
             </a:pPr>
-            <a:endParaRPr/>
+            <a:endParaRPr dirty="0"/>
           </a:p>
           <a:p>
             <a:pPr lvl="0" rtl="0">
@@ -6371,7 +6371,7 @@
               <a:buNone/>
             </a:pPr>
             <a:r>
-              <a:rPr lang="en" sz="1400">
+              <a:rPr lang="en" sz="1400" dirty="0">
                 <a:solidFill>
                   <a:srgbClr val="000000"/>
                 </a:solidFill>
@@ -6380,19 +6380,55 @@
                 <a:cs typeface="Consolas"/>
                 <a:sym typeface="Consolas"/>
               </a:rPr>
-              <a:t>class Bagel(db.Model):	</a:t>
-            </a:r>
-            <a:r>
-              <a:rPr lang="en" sz="1400">
-                <a:solidFill>
-                  <a:srgbClr val="999999"/>
+              <a:t>class Bagel(db.Model</a:t>
+            </a:r>
+            <a:r>
+              <a:rPr lang="en" sz="1400" dirty="0" smtClean="0">
+                <a:solidFill>
+                  <a:srgbClr val="000000"/>
                 </a:solidFill>
                 <a:latin typeface="Consolas"/>
                 <a:ea typeface="Consolas"/>
                 <a:cs typeface="Consolas"/>
                 <a:sym typeface="Consolas"/>
               </a:rPr>
-              <a:t>// should match the db table name, except for capitalization</a:t>
+              <a:t>):</a:t>
+            </a:r>
+            <a:r>
+              <a:rPr lang="en-US" sz="1400" dirty="0" smtClean="0">
+                <a:solidFill>
+                  <a:srgbClr val="000000"/>
+                </a:solidFill>
+                <a:latin typeface="Consolas"/>
+                <a:ea typeface="Consolas"/>
+                <a:cs typeface="Consolas"/>
+                <a:sym typeface="Consolas"/>
+              </a:rPr>
+              <a:t> </a:t>
+            </a:r>
+            <a:r>
+              <a:rPr lang="en" sz="1400" dirty="0" smtClean="0">
+                <a:solidFill>
+                  <a:srgbClr val="999999"/>
+                </a:solidFill>
+                <a:latin typeface="Consolas"/>
+                <a:ea typeface="Consolas"/>
+                <a:cs typeface="Consolas"/>
+                <a:sym typeface="Consolas"/>
+              </a:rPr>
+              <a:t>// </a:t>
+            </a:r>
+            <a:r>
+              <a:rPr lang="en" sz="1400" dirty="0">
+                <a:solidFill>
+                  <a:srgbClr val="999999"/>
+                </a:solidFill>
+                <a:latin typeface="Consolas"/>
+                <a:ea typeface="Consolas"/>
+                <a:cs typeface="Consolas"/>
+                <a:sym typeface="Consolas"/>
+              </a:rPr>
+              <a:t>should match the db table name, except for capitalization</a:t>
             </a:r>
           </a:p>
           <a:p>
@@ -6409,7 +6445,7 @@
               <a:buNone/>
             </a:pPr>
             <a:r>
-              <a:rPr lang="en" sz="1400">
+              <a:rPr lang="en" sz="1400" dirty="0">
                 <a:solidFill>
                   <a:srgbClr val="000000"/>
                 </a:solidFill>
@@ -6435,7 +6471,7 @@
               <a:buNone/>
             </a:pPr>
             <a:r>
-              <a:rPr lang="en" sz="1400">
+              <a:rPr lang="en" sz="1400" dirty="0">
                 <a:solidFill>
                   <a:srgbClr val="000000"/>
                 </a:solidFill>
@@ -6460,7 +6496,7 @@
               </a:spcAft>
               <a:buNone/>
             </a:pPr>
-            <a:endParaRPr sz="1400">
+            <a:endParaRPr sz="1400" dirty="0">
               <a:solidFill>
                 <a:srgbClr val="000000"/>
               </a:solidFill>
@@ -6484,7 +6520,7 @@
               <a:buNone/>
             </a:pPr>
             <a:r>
-              <a:rPr lang="en" sz="1400">
+              <a:rPr lang="en" sz="1400" dirty="0">
                 <a:solidFill>
                   <a:srgbClr val="000000"/>
                 </a:solidFill>
@@ -6496,7 +6532,7 @@
               <a:t>    def __init__(self, name, price):	</a:t>
             </a:r>
             <a:r>
-              <a:rPr lang="en" sz="1400">
+              <a:rPr lang="en" sz="1400" dirty="0">
                 <a:solidFill>
                   <a:srgbClr val="999999"/>
                 </a:solidFill>
@@ -6522,7 +6558,7 @@
               <a:buNone/>
             </a:pPr>
             <a:r>
-              <a:rPr lang="en" sz="1400">
+              <a:rPr lang="en" sz="1400" dirty="0">
                 <a:solidFill>
                   <a:srgbClr val="000000"/>
                 </a:solidFill>
@@ -6548,7 +6584,7 @@
               <a:buNone/>
             </a:pPr>
             <a:r>
-              <a:rPr lang="en" sz="1400">
+              <a:rPr lang="en" sz="1400" dirty="0">
                 <a:solidFill>
                   <a:srgbClr val="000000"/>
                 </a:solidFill>
@@ -6652,7 +6688,7 @@
           <a:p>
             <a:pPr lvl="0" rtl="0">
               <a:lnSpc>
-                <a:spcPct val="100000"/>
+                <a:spcPct val="150000"/>
               </a:lnSpc>
               <a:spcBef>
                 <a:spcPts val="0"/>
@@ -6666,29 +6702,6 @@
               <a:rPr lang="en" dirty="0"/>
               <a:t>The final piece is to actually connect our model to our database.</a:t>
             </a:r>
-          </a:p>
-          <a:p>
-            <a:pPr lvl="0" rtl="0">
-              <a:lnSpc>
-                <a:spcPct val="100000"/>
-              </a:lnSpc>
-              <a:spcBef>
-                <a:spcPts val="0"/>
-              </a:spcBef>
-              <a:spcAft>
-                <a:spcPts val="0"/>
-              </a:spcAft>
-              <a:buNone/>
-            </a:pPr>
-            <a:endParaRPr sz="1200" dirty="0">
-              <a:solidFill>
-                <a:srgbClr val="000000"/>
-              </a:solidFill>
-              <a:latin typeface="Consolas"/>
-              <a:ea typeface="Consolas"/>
-              <a:cs typeface="Consolas"/>
-              <a:sym typeface="Consolas"/>
-            </a:endParaRPr>
           </a:p>
           <a:p>
             <a:pPr marL="514350" lvl="0" indent="-285750" rtl="0">
@@ -6699,42 +6712,28 @@
                 <a:spcPts val="0"/>
               </a:spcBef>
               <a:spcAft>
-                <a:spcPts val="1000"/>
+                <a:spcPts val="0"/>
               </a:spcAft>
               <a:buFont typeface="Arial"/>
               <a:buChar char="•"/>
             </a:pPr>
             <a:r>
-              <a:rPr lang="en-US" dirty="0"/>
-              <a:t>A</a:t>
-            </a:r>
-            <a:r>
-              <a:rPr lang="en" dirty="0" smtClean="0"/>
-              <a:t>dd </a:t>
-            </a:r>
-            <a:r>
               <a:rPr lang="en" dirty="0"/>
-              <a:t>another import:</a:t>
-            </a:r>
-          </a:p>
-          <a:p>
-            <a:pPr lvl="0" rtl="0">
+              <a:t>In the terminal, while in the virtual env, run this:</a:t>
+            </a:r>
+          </a:p>
+          <a:p>
+            <a:pPr lvl="0" indent="457200" rtl="0">
               <a:lnSpc>
                 <a:spcPct val="100000"/>
               </a:lnSpc>
               <a:spcBef>
                 <a:spcPts val="0"/>
               </a:spcBef>
-              <a:spcAft>
-                <a:spcPts val="1000"/>
-              </a:spcAft>
-            </a:pPr>
-            <a:r>
-              <a:rPr lang="en-US" dirty="0"/>
-              <a:t>	</a:t>
-            </a:r>
-            <a:r>
-              <a:rPr lang="en" sz="1400" dirty="0" smtClean="0">
+              <a:buNone/>
+            </a:pPr>
+            <a:r>
+              <a:rPr lang="en-US" sz="1400" dirty="0" smtClean="0">
                 <a:solidFill>
                   <a:srgbClr val="000000"/>
                 </a:solidFill>
@@ -6743,10 +6742,10 @@
                 <a:cs typeface="Consolas"/>
                 <a:sym typeface="Consolas"/>
               </a:rPr>
-              <a:t>from </a:t>
-            </a:r>
-            <a:r>
-              <a:rPr lang="en" sz="1400" dirty="0">
+              <a:t>	</a:t>
+            </a:r>
+            <a:r>
+              <a:rPr lang="en" sz="1400" dirty="0" smtClean="0">
                 <a:solidFill>
                   <a:srgbClr val="000000"/>
                 </a:solidFill>
@@ -6755,7 +6754,66 @@
                 <a:cs typeface="Consolas"/>
                 <a:sym typeface="Consolas"/>
               </a:rPr>
-              <a:t>flask_sqlalchemy import SQLAlchemy</a:t>
+              <a:t>sudo </a:t>
+            </a:r>
+            <a:r>
+              <a:rPr lang="en" sz="1400" dirty="0">
+                <a:solidFill>
+                  <a:srgbClr val="000000"/>
+                </a:solidFill>
+                <a:latin typeface="Consolas"/>
+                <a:ea typeface="Consolas"/>
+                <a:cs typeface="Consolas"/>
+                <a:sym typeface="Consolas"/>
+              </a:rPr>
+              <a:t>pip install flask_sqlalchemy</a:t>
+            </a:r>
+            <a:br>
+              <a:rPr lang="en" sz="1400" dirty="0">
+                <a:solidFill>
+                  <a:srgbClr val="000000"/>
+                </a:solidFill>
+                <a:latin typeface="Consolas"/>
+                <a:ea typeface="Consolas"/>
+                <a:cs typeface="Consolas"/>
+                <a:sym typeface="Consolas"/>
+              </a:rPr>
+            </a:br>
+            <a:r>
+              <a:rPr lang="en-US" sz="1400" dirty="0" smtClean="0">
+                <a:solidFill>
+                  <a:srgbClr val="000000"/>
+                </a:solidFill>
+                <a:latin typeface="Consolas"/>
+                <a:ea typeface="Consolas"/>
+                <a:cs typeface="Consolas"/>
+                <a:sym typeface="Consolas"/>
+              </a:rPr>
+              <a:t>	</a:t>
+            </a:r>
+            <a:r>
+              <a:rPr lang="en" sz="1400" dirty="0" smtClean="0">
+                <a:solidFill>
+                  <a:srgbClr val="000000"/>
+                </a:solidFill>
+                <a:latin typeface="Consolas"/>
+                <a:ea typeface="Consolas"/>
+                <a:cs typeface="Consolas"/>
+                <a:sym typeface="Consolas"/>
+              </a:rPr>
+              <a:t>sudo </a:t>
+            </a:r>
+            <a:r>
+              <a:rPr lang="en" sz="1400" dirty="0">
+                <a:solidFill>
+                  <a:srgbClr val="000000"/>
+                </a:solidFill>
+                <a:latin typeface="Consolas"/>
+                <a:ea typeface="Consolas"/>
+                <a:cs typeface="Consolas"/>
+                <a:sym typeface="Consolas"/>
+              </a:rPr>
+              <a:t>pip install pymysql</a:t>
             </a:r>
           </a:p>
           <a:p>
@@ -6767,17 +6825,74 @@
                 <a:spcPts val="0"/>
               </a:spcBef>
               <a:spcAft>
-                <a:spcPts val="1000"/>
+                <a:spcPts val="0"/>
               </a:spcAft>
               <a:buFont typeface="Arial"/>
               <a:buChar char="•"/>
             </a:pPr>
             <a:r>
+              <a:rPr lang="en-US" dirty="0"/>
+              <a:t>A</a:t>
+            </a:r>
+            <a:r>
+              <a:rPr lang="en" dirty="0" smtClean="0"/>
+              <a:t>dd </a:t>
+            </a:r>
+            <a:r>
+              <a:rPr lang="en" dirty="0"/>
+              <a:t>another import:</a:t>
+            </a:r>
+          </a:p>
+          <a:p>
+            <a:pPr lvl="0" rtl="0">
+              <a:lnSpc>
+                <a:spcPct val="100000"/>
+              </a:lnSpc>
+              <a:spcBef>
+                <a:spcPts val="0"/>
+              </a:spcBef>
+              <a:spcAft>
+                <a:spcPts val="1000"/>
+              </a:spcAft>
+              <a:buNone/>
+            </a:pPr>
+            <a:r>
+              <a:rPr lang="en" dirty="0"/>
+              <a:t>	</a:t>
+            </a:r>
+            <a:r>
+              <a:rPr lang="en" sz="1400" dirty="0">
+                <a:solidFill>
+                  <a:srgbClr val="000000"/>
+                </a:solidFill>
+                <a:latin typeface="Consolas"/>
+                <a:ea typeface="Consolas"/>
+                <a:cs typeface="Consolas"/>
+                <a:sym typeface="Consolas"/>
+              </a:rPr>
+              <a:t>from flask_sqlalchemy import SQLAlchemy</a:t>
+            </a:r>
+          </a:p>
+          <a:p>
+            <a:pPr marL="514350" lvl="0" indent="-285750" rtl="0">
+              <a:lnSpc>
+                <a:spcPct val="100000"/>
+              </a:lnSpc>
+              <a:spcBef>
+                <a:spcPts val="0"/>
+              </a:spcBef>
+              <a:spcAft>
+                <a:spcPts val="0"/>
+              </a:spcAft>
+              <a:buFont typeface="Arial"/>
+              <a:buChar char="•"/>
+            </a:pPr>
+            <a:r>
               <a:rPr lang="en" dirty="0"/>
               <a:t>Add this configuration somewhere at the top of the file, after you’ve instantiated </a:t>
             </a:r>
             <a:r>
-              <a:rPr lang="en" dirty="0" smtClean="0">
+              <a:rPr lang="en" dirty="0">
                 <a:solidFill>
                   <a:srgbClr val="000000"/>
                 </a:solidFill>
@@ -6788,18 +6903,18 @@
               </a:rPr>
               <a:t>app</a:t>
             </a:r>
-            <a:endParaRPr lang="en-US" dirty="0" smtClean="0">
-              <a:solidFill>
-                <a:srgbClr val="000000"/>
-              </a:solidFill>
-              <a:latin typeface="Consolas"/>
-              <a:ea typeface="Consolas"/>
-              <a:cs typeface="Consolas"/>
-              <a:sym typeface="Consolas"/>
-            </a:endParaRPr>
-          </a:p>
-          <a:p>
-            <a:pPr marL="228600" lvl="0" rtl="0">
+            <a:r>
+              <a:rPr lang="en" dirty="0">
+                <a:latin typeface="Consolas"/>
+                <a:ea typeface="Consolas"/>
+                <a:cs typeface="Consolas"/>
+                <a:sym typeface="Consolas"/>
+              </a:rPr>
+              <a:t>:</a:t>
+            </a:r>
+          </a:p>
+          <a:p>
+            <a:pPr marL="457200" lvl="0" indent="0" rtl="0">
               <a:lnSpc>
                 <a:spcPct val="100000"/>
               </a:lnSpc>
@@ -6809,6 +6924,7 @@
               <a:spcAft>
                 <a:spcPts val="1000"/>
               </a:spcAft>
+              <a:buNone/>
             </a:pPr>
             <a:r>
               <a:rPr lang="en-US" sz="1400" dirty="0" smtClean="0">
@@ -6988,14 +7104,14 @@
                 <a:spcPts val="0"/>
               </a:spcBef>
               <a:spcAft>
-                <a:spcPts val="1000"/>
+                <a:spcPts val="0"/>
               </a:spcAft>
               <a:buFont typeface="Arial"/>
               <a:buChar char="•"/>
             </a:pPr>
             <a:r>
               <a:rPr lang="en" dirty="0"/>
-              <a:t>Finally, instantiate a db object</a:t>
+              <a:t>Finally, instantiate a db object:</a:t>
             </a:r>
           </a:p>
           <a:p>
@@ -7176,7 +7292,7 @@
             </a:r>
           </a:p>
           <a:p>
-            <a:pPr marL="685800" lvl="1" rtl="0">
+            <a:pPr marL="914400" lvl="1" indent="-228600" rtl="0">
               <a:lnSpc>
                 <a:spcPct val="100000"/>
               </a:lnSpc>
@@ -7189,6 +7305,7 @@
               <a:buClr>
                 <a:srgbClr val="000000"/>
               </a:buClr>
+              <a:buFont typeface="Consolas"/>
             </a:pPr>
             <a:r>
               <a:rPr lang="en" dirty="0">
@@ -7224,7 +7341,7 @@
             </a:r>
           </a:p>
           <a:p>
-            <a:pPr marL="685800" lvl="1" rtl="0">
+            <a:pPr marL="914400" lvl="1" indent="-228600" rtl="0">
               <a:lnSpc>
                 <a:spcPct val="100000"/>
               </a:lnSpc>
@@ -7237,6 +7354,7 @@
               <a:buClr>
                 <a:srgbClr val="000000"/>
               </a:buClr>
+              <a:buFont typeface="Consolas"/>
             </a:pPr>
             <a:r>
               <a:rPr lang="en" dirty="0">
@@ -7268,23 +7386,31 @@
             </a:pPr>
             <a:r>
               <a:rPr lang="en" sz="1400" dirty="0"/>
-              <a:t>Creating a new record and saving it to the database</a:t>
-            </a:r>
-          </a:p>
-          <a:p>
-            <a:pPr marL="685800" lvl="1" rtl="0">
+              <a:t>Creating a new record and saving it to the </a:t>
+            </a:r>
+            <a:r>
+              <a:rPr lang="en" sz="1400" dirty="0" smtClean="0"/>
+              <a:t>database</a:t>
+            </a:r>
+          </a:p>
+          <a:p>
+            <a:pPr marL="914400" lvl="1" indent="-228600" rtl="0">
               <a:lnSpc>
                 <a:spcPct val="100000"/>
               </a:lnSpc>
               <a:spcBef>
                 <a:spcPts val="0"/>
               </a:spcBef>
+              <a:spcAft>
+                <a:spcPts val="0"/>
+              </a:spcAft>
               <a:buClr>
                 <a:srgbClr val="000000"/>
               </a:buClr>
-            </a:pPr>
-            <a:r>
-              <a:rPr lang="en" dirty="0">
+              <a:buFont typeface="Consolas"/>
+            </a:pPr>
+            <a:r>
+              <a:rPr lang="en" dirty="0" smtClean="0">
                 <a:solidFill>
                   <a:srgbClr val="000000"/>
                 </a:solidFill>
@@ -7293,8 +7419,34 @@
                 <a:cs typeface="Consolas"/>
                 <a:sym typeface="Consolas"/>
               </a:rPr>
-              <a:t>new_bagel = Bagel(name=“cheese bagel”, </a:t>
-            </a:r>
+              <a:t>new_bagel = Bagel(name=“cheese bagel”, price=2.50)</a:t>
+            </a:r>
+            <a:endParaRPr lang="en-US" dirty="0" smtClean="0">
+              <a:solidFill>
+                <a:srgbClr val="000000"/>
+              </a:solidFill>
+              <a:latin typeface="Consolas"/>
+              <a:ea typeface="Consolas"/>
+              <a:cs typeface="Consolas"/>
+              <a:sym typeface="Consolas"/>
+            </a:endParaRPr>
+          </a:p>
+          <a:p>
+            <a:pPr marL="914400" lvl="1" indent="-228600" rtl="0">
+              <a:lnSpc>
+                <a:spcPct val="100000"/>
+              </a:lnSpc>
+              <a:spcBef>
+                <a:spcPts val="0"/>
+              </a:spcBef>
+              <a:spcAft>
+                <a:spcPts val="0"/>
+              </a:spcAft>
+              <a:buClr>
+                <a:srgbClr val="000000"/>
+              </a:buClr>
+              <a:buFont typeface="Consolas"/>
+            </a:pPr>
             <a:r>
               <a:rPr lang="en" dirty="0" smtClean="0">
                 <a:solidFill>
@@ -7305,57 +7457,10 @@
                 <a:cs typeface="Consolas"/>
                 <a:sym typeface="Consolas"/>
               </a:rPr>
-              <a:t>price=2.50)</a:t>
-            </a:r>
-            <a:r>
-              <a:rPr lang="en-US" dirty="0">
-                <a:solidFill>
-                  <a:srgbClr val="000000"/>
-                </a:solidFill>
-                <a:latin typeface="Consolas"/>
-                <a:ea typeface="Consolas"/>
-                <a:cs typeface="Consolas"/>
-                <a:sym typeface="Consolas"/>
-              </a:rPr>
-              <a:t/>
-            </a:r>
-            <a:br>
-              <a:rPr lang="en-US" dirty="0">
-                <a:solidFill>
-                  <a:srgbClr val="000000"/>
-                </a:solidFill>
-                <a:latin typeface="Consolas"/>
-                <a:ea typeface="Consolas"/>
-                <a:cs typeface="Consolas"/>
-                <a:sym typeface="Consolas"/>
-              </a:rPr>
-            </a:br>
+              <a:t>db.session.add(new_bagel)</a:t>
+            </a:r>
             <a:r>
               <a:rPr lang="en" dirty="0" smtClean="0">
-                <a:solidFill>
-                  <a:srgbClr val="000000"/>
-                </a:solidFill>
-                <a:latin typeface="Consolas"/>
-                <a:ea typeface="Consolas"/>
-                <a:cs typeface="Consolas"/>
-                <a:sym typeface="Consolas"/>
-              </a:rPr>
-              <a:t>db.session.add(new_bagel</a:t>
-            </a:r>
-            <a:r>
-              <a:rPr lang="en" dirty="0">
-                <a:solidFill>
-                  <a:srgbClr val="000000"/>
-                </a:solidFill>
-                <a:latin typeface="Consolas"/>
-                <a:ea typeface="Consolas"/>
-                <a:cs typeface="Consolas"/>
-                <a:sym typeface="Consolas"/>
-              </a:rPr>
-              <a:t>)</a:t>
-            </a:r>
-            <a:r>
-              <a:rPr lang="en" dirty="0">
                 <a:latin typeface="Consolas"/>
                 <a:ea typeface="Consolas"/>
                 <a:cs typeface="Consolas"/>
@@ -7364,7 +7469,7 @@
               <a:t> </a:t>
             </a:r>
             <a:r>
-              <a:rPr lang="en" dirty="0">
+              <a:rPr lang="en" dirty="0" smtClean="0">
                 <a:solidFill>
                   <a:srgbClr val="999999"/>
                 </a:solidFill>
@@ -7373,43 +7478,22 @@
                 <a:cs typeface="Consolas"/>
                 <a:sym typeface="Consolas"/>
               </a:rPr>
-              <a:t>// registering the change in the </a:t>
-            </a:r>
-            <a:r>
-              <a:rPr lang="en" dirty="0" smtClean="0">
-                <a:solidFill>
-                  <a:srgbClr val="999999"/>
-                </a:solidFill>
-                <a:latin typeface="Consolas"/>
-                <a:ea typeface="Consolas"/>
-                <a:cs typeface="Consolas"/>
-                <a:sym typeface="Consolas"/>
-              </a:rPr>
-              <a:t>session</a:t>
-            </a:r>
-            <a:r>
-              <a:rPr lang="en-US" dirty="0" smtClean="0">
-                <a:solidFill>
-                  <a:srgbClr val="999999"/>
-                </a:solidFill>
-                <a:latin typeface="Consolas"/>
-                <a:ea typeface="Consolas"/>
-                <a:cs typeface="Consolas"/>
-                <a:sym typeface="Consolas"/>
-              </a:rPr>
-              <a:t/>
-            </a:r>
-            <a:br>
-              <a:rPr lang="en-US" dirty="0" smtClean="0">
-                <a:solidFill>
-                  <a:srgbClr val="999999"/>
-                </a:solidFill>
-                <a:latin typeface="Consolas"/>
-                <a:ea typeface="Consolas"/>
-                <a:cs typeface="Consolas"/>
-                <a:sym typeface="Consolas"/>
-              </a:rPr>
-            </a:br>
+              <a:t>// registering the change in the session</a:t>
+            </a:r>
+          </a:p>
+          <a:p>
+            <a:pPr marL="914400" lvl="1" indent="-228600" rtl="0">
+              <a:lnSpc>
+                <a:spcPct val="100000"/>
+              </a:lnSpc>
+              <a:spcBef>
+                <a:spcPts val="0"/>
+              </a:spcBef>
+              <a:spcAft>
+                <a:spcPts val="0"/>
+              </a:spcAft>
+              <a:buFont typeface="Consolas"/>
+            </a:pPr>
             <a:r>
               <a:rPr lang="en" dirty="0" smtClean="0">
                 <a:solidFill>
@@ -7717,8 +7801,6 @@
                 <a:spcPts val="1000"/>
               </a:spcAft>
               <a:buSzPct val="100000"/>
-              <a:buFont typeface="Arial"/>
-              <a:buChar char="•"/>
             </a:pPr>
             <a:r>
               <a:rPr lang="en" sz="1400" dirty="0"/>
@@ -7734,8 +7816,6 @@
                 <a:spcPts val="1000"/>
               </a:spcAft>
               <a:buSzPct val="100000"/>
-              <a:buFont typeface="Arial"/>
-              <a:buChar char="•"/>
             </a:pPr>
             <a:r>
               <a:rPr lang="en" sz="1400" dirty="0"/>
@@ -7817,10 +7897,10 @@
                 <a:cs typeface="Consolas"/>
                 <a:sym typeface="Consolas"/>
               </a:rPr>
-              <a:t>bagel.price = 2.00 	</a:t>
-            </a:r>
-            <a:r>
-              <a:rPr lang="en" sz="1400" dirty="0">
+              <a:t>bagel.price = 2.00 </a:t>
+            </a:r>
+            <a:r>
+              <a:rPr lang="en" sz="1400" dirty="0" smtClean="0">
                 <a:solidFill>
                   <a:srgbClr val="999999"/>
                 </a:solidFill>
@@ -7829,45 +7909,93 @@
                 <a:cs typeface="Consolas"/>
                 <a:sym typeface="Consolas"/>
               </a:rPr>
-              <a:t>// modify the price field to be 2.00</a:t>
-            </a:r>
-          </a:p>
-          <a:p>
-            <a:pPr marL="0" lvl="0" indent="0" rtl="0">
-              <a:lnSpc>
-                <a:spcPct val="100000"/>
-              </a:lnSpc>
-              <a:spcBef>
-                <a:spcPts val="0"/>
-              </a:spcBef>
-              <a:spcAft>
-                <a:spcPts val="0"/>
-              </a:spcAft>
-              <a:buNone/>
-            </a:pPr>
+              <a:t>// </a:t>
+            </a:r>
             <a:r>
               <a:rPr lang="en" sz="1400" dirty="0">
                 <a:solidFill>
-                  <a:srgbClr val="000000"/>
+                  <a:srgbClr val="999999"/>
                 </a:solidFill>
                 <a:latin typeface="Consolas"/>
                 <a:ea typeface="Consolas"/>
                 <a:cs typeface="Consolas"/>
                 <a:sym typeface="Consolas"/>
               </a:rPr>
-              <a:t>db.session.add(bagel)	</a:t>
-            </a:r>
+              <a:t>modify the price field to be 2.00</a:t>
+            </a:r>
+          </a:p>
+          <a:p>
+            <a:pPr marL="0" lvl="0" indent="0" rtl="0">
+              <a:lnSpc>
+                <a:spcPct val="100000"/>
+              </a:lnSpc>
+              <a:spcBef>
+                <a:spcPts val="0"/>
+              </a:spcBef>
+              <a:spcAft>
+                <a:spcPts val="0"/>
+              </a:spcAft>
+              <a:buNone/>
+            </a:pPr>
             <a:r>
               <a:rPr lang="en" sz="1400" dirty="0">
                 <a:solidFill>
-                  <a:srgbClr val="999999"/>
+                  <a:srgbClr val="000000"/>
                 </a:solidFill>
                 <a:latin typeface="Consolas"/>
                 <a:ea typeface="Consolas"/>
                 <a:cs typeface="Consolas"/>
                 <a:sym typeface="Consolas"/>
               </a:rPr>
-              <a:t>// register the updated record in the session </a:t>
+              <a:t>db.session.add(bagel</a:t>
+            </a:r>
+            <a:r>
+              <a:rPr lang="en" sz="1400" dirty="0" smtClean="0">
+                <a:solidFill>
+                  <a:srgbClr val="000000"/>
+                </a:solidFill>
+                <a:latin typeface="Consolas"/>
+                <a:ea typeface="Consolas"/>
+                <a:cs typeface="Consolas"/>
+                <a:sym typeface="Consolas"/>
+              </a:rPr>
+              <a:t>)</a:t>
+            </a:r>
+            <a:r>
+              <a:rPr lang="en-US" sz="1400" dirty="0" smtClean="0">
+                <a:solidFill>
+                  <a:srgbClr val="000000"/>
+                </a:solidFill>
+                <a:latin typeface="Consolas"/>
+                <a:ea typeface="Consolas"/>
+                <a:cs typeface="Consolas"/>
+                <a:sym typeface="Consolas"/>
+              </a:rPr>
+              <a:t> </a:t>
+            </a:r>
+            <a:r>
+              <a:rPr lang="en" sz="1400" dirty="0" smtClean="0">
+                <a:solidFill>
+                  <a:srgbClr val="999999"/>
+                </a:solidFill>
+                <a:latin typeface="Consolas"/>
+                <a:ea typeface="Consolas"/>
+                <a:cs typeface="Consolas"/>
+                <a:sym typeface="Consolas"/>
+              </a:rPr>
+              <a:t>// </a:t>
+            </a:r>
+            <a:r>
+              <a:rPr lang="en" sz="1400" dirty="0">
+                <a:solidFill>
+                  <a:srgbClr val="999999"/>
+                </a:solidFill>
+                <a:latin typeface="Consolas"/>
+                <a:ea typeface="Consolas"/>
+                <a:cs typeface="Consolas"/>
+                <a:sym typeface="Consolas"/>
+              </a:rPr>
+              <a:t>register the updated record in the session </a:t>
             </a:r>
           </a:p>
           <a:p>
@@ -7919,41 +8047,56 @@
                 <a:cs typeface="Consolas"/>
                 <a:sym typeface="Consolas"/>
               </a:rPr>
-              <a:t>db.session.commit()	</a:t>
-            </a:r>
-            <a:r>
-              <a:rPr lang="en" sz="1400" dirty="0">
-                <a:solidFill>
-                  <a:srgbClr val="999999"/>
+              <a:t>db.session.commit</a:t>
+            </a:r>
+            <a:r>
+              <a:rPr lang="en" sz="1400" dirty="0" smtClean="0">
+                <a:solidFill>
+                  <a:srgbClr val="000000"/>
                 </a:solidFill>
                 <a:latin typeface="Consolas"/>
                 <a:ea typeface="Consolas"/>
                 <a:cs typeface="Consolas"/>
                 <a:sym typeface="Consolas"/>
               </a:rPr>
-              <a:t>// write changes registered in the session to the </a:t>
-            </a:r>
-            <a:r>
-              <a:rPr lang="en-US" sz="1400" dirty="0" err="1" smtClean="0">
-                <a:solidFill>
-                  <a:srgbClr val="999999"/>
+              <a:t>()</a:t>
+            </a:r>
+            <a:r>
+              <a:rPr lang="en-US" sz="1400" dirty="0" smtClean="0">
+                <a:solidFill>
+                  <a:srgbClr val="000000"/>
                 </a:solidFill>
                 <a:latin typeface="Consolas"/>
                 <a:ea typeface="Consolas"/>
                 <a:cs typeface="Consolas"/>
                 <a:sym typeface="Consolas"/>
               </a:rPr>
-              <a:t>db</a:t>
-            </a:r>
-            <a:endParaRPr lang="en" sz="1400" dirty="0">
-              <a:solidFill>
-                <a:srgbClr val="999999"/>
-              </a:solidFill>
-              <a:latin typeface="Consolas"/>
-              <a:ea typeface="Consolas"/>
-              <a:cs typeface="Consolas"/>
-              <a:sym typeface="Consolas"/>
-            </a:endParaRPr>
+              <a:t> </a:t>
+            </a:r>
+            <a:r>
+              <a:rPr lang="en" sz="1400" dirty="0" smtClean="0">
+                <a:solidFill>
+                  <a:srgbClr val="999999"/>
+                </a:solidFill>
+                <a:latin typeface="Consolas"/>
+                <a:ea typeface="Consolas"/>
+                <a:cs typeface="Consolas"/>
+                <a:sym typeface="Consolas"/>
+              </a:rPr>
+              <a:t>// </a:t>
+            </a:r>
+            <a:r>
+              <a:rPr lang="en" sz="1400" dirty="0">
+                <a:solidFill>
+                  <a:srgbClr val="999999"/>
+                </a:solidFill>
+                <a:latin typeface="Consolas"/>
+                <a:ea typeface="Consolas"/>
+                <a:cs typeface="Consolas"/>
+                <a:sym typeface="Consolas"/>
+              </a:rPr>
+              <a:t>write changes registered in the session to the database</a:t>
+            </a:r>
           </a:p>
           <a:p>
             <a:pPr marL="0" lvl="0" indent="0" rtl="0">

</xml_diff>